<commit_message>
- Fixed: Extra space - Updated: Template design
</commit_message>
<xml_diff>
--- a/Tasks - Template - No Left.pptx
+++ b/Tasks - Template - No Left.pptx
@@ -781,7 +781,7 @@
             <a:fld id="{07804B90-9912-42C8-BA0E-9FC0A6BC0793}" type="datetime8">
               <a:rPr lang="he-IL" smtClean="0"/>
               <a:pPr/>
-              <a:t>26 נובמבר 15</a:t>
+              <a:t>01 דצמבר 15</a:t>
             </a:fld>
             <a:endParaRPr lang="he-IL"/>
           </a:p>
@@ -948,7 +948,7 @@
             <a:fld id="{4FC8F92C-E7ED-4D50-BF01-90E6F05ADB47}" type="datetime8">
               <a:rPr lang="he-IL" smtClean="0"/>
               <a:pPr/>
-              <a:t>26 נובמבר 15</a:t>
+              <a:t>01 דצמבר 15</a:t>
             </a:fld>
             <a:endParaRPr lang="he-IL"/>
           </a:p>
@@ -1125,7 +1125,7 @@
             <a:fld id="{BB1E4F72-57C3-4F4E-B209-0100575C922A}" type="datetime8">
               <a:rPr lang="he-IL" smtClean="0"/>
               <a:pPr/>
-              <a:t>26 נובמבר 15</a:t>
+              <a:t>01 דצמבר 15</a:t>
             </a:fld>
             <a:endParaRPr lang="he-IL"/>
           </a:p>
@@ -1292,7 +1292,7 @@
             <a:fld id="{03F8D550-4BE1-4813-9BF3-2E5655BFF65B}" type="datetime8">
               <a:rPr lang="he-IL" smtClean="0"/>
               <a:pPr/>
-              <a:t>26 נובמבר 15</a:t>
+              <a:t>01 דצמבר 15</a:t>
             </a:fld>
             <a:endParaRPr lang="he-IL"/>
           </a:p>
@@ -1535,7 +1535,7 @@
             <a:fld id="{69E1F784-D13F-4D7B-9F23-FB4B9CAAD233}" type="datetime8">
               <a:rPr lang="he-IL" smtClean="0"/>
               <a:pPr/>
-              <a:t>26 נובמבר 15</a:t>
+              <a:t>01 דצמבר 15</a:t>
             </a:fld>
             <a:endParaRPr lang="he-IL"/>
           </a:p>
@@ -1820,7 +1820,7 @@
             <a:fld id="{217D017C-30CC-4CD6-8275-DF8EF54835B0}" type="datetime8">
               <a:rPr lang="he-IL" smtClean="0"/>
               <a:pPr/>
-              <a:t>26 נובמבר 15</a:t>
+              <a:t>01 דצמבר 15</a:t>
             </a:fld>
             <a:endParaRPr lang="he-IL"/>
           </a:p>
@@ -2239,7 +2239,7 @@
             <a:fld id="{1866F88B-B92E-4516-9A2E-D93B7749C0E1}" type="datetime8">
               <a:rPr lang="he-IL" smtClean="0"/>
               <a:pPr/>
-              <a:t>26 נובמבר 15</a:t>
+              <a:t>01 דצמבר 15</a:t>
             </a:fld>
             <a:endParaRPr lang="he-IL"/>
           </a:p>
@@ -2354,7 +2354,7 @@
             <a:fld id="{A680602D-4A41-4DFC-95D4-336A27DF9101}" type="datetime8">
               <a:rPr lang="he-IL" smtClean="0"/>
               <a:pPr/>
-              <a:t>26 נובמבר 15</a:t>
+              <a:t>01 דצמבר 15</a:t>
             </a:fld>
             <a:endParaRPr lang="he-IL"/>
           </a:p>
@@ -2446,7 +2446,7 @@
             <a:fld id="{A6FECEB8-91EA-40F5-952B-F186C677B3AC}" type="datetime8">
               <a:rPr lang="he-IL" smtClean="0"/>
               <a:pPr/>
-              <a:t>26 נובמבר 15</a:t>
+              <a:t>01 דצמבר 15</a:t>
             </a:fld>
             <a:endParaRPr lang="he-IL"/>
           </a:p>
@@ -2720,7 +2720,7 @@
             <a:fld id="{A23D05BF-E7F7-44C1-B9BA-193416E6943B}" type="datetime8">
               <a:rPr lang="he-IL" smtClean="0"/>
               <a:pPr/>
-              <a:t>26 נובמבר 15</a:t>
+              <a:t>01 דצמבר 15</a:t>
             </a:fld>
             <a:endParaRPr lang="he-IL"/>
           </a:p>
@@ -2970,7 +2970,7 @@
             <a:fld id="{196AB0F6-2876-4040-AF90-0E2B7F359233}" type="datetime8">
               <a:rPr lang="he-IL" smtClean="0"/>
               <a:pPr/>
-              <a:t>26 נובמבר 15</a:t>
+              <a:t>01 דצמבר 15</a:t>
             </a:fld>
             <a:endParaRPr lang="he-IL"/>
           </a:p>
@@ -3180,7 +3180,7 @@
             <a:fld id="{556212AB-3C14-44EA-ADB9-C0E2E4C9AFDE}" type="datetime8">
               <a:rPr lang="he-IL" smtClean="0"/>
               <a:pPr/>
-              <a:t>26 נובמבר 15</a:t>
+              <a:t>01 דצמבר 15</a:t>
             </a:fld>
             <a:endParaRPr lang="he-IL"/>
           </a:p>
@@ -3563,7 +3563,7 @@
         <p:spPr>
           <a:xfrm>
             <a:off x="0" y="879135"/>
-            <a:ext cx="9906000" cy="911619"/>
+            <a:ext cx="9906000" cy="799955"/>
           </a:xfrm>
           <a:prstGeom prst="rect">
             <a:avLst/>
@@ -3612,8 +3612,8 @@
         </p:nvSpPr>
         <p:spPr>
           <a:xfrm>
-            <a:off x="0" y="1771176"/>
-            <a:ext cx="9906000" cy="5066196"/>
+            <a:off x="0" y="1679091"/>
+            <a:ext cx="9906000" cy="5178910"/>
           </a:xfrm>
           <a:prstGeom prst="rect">
             <a:avLst/>
@@ -3678,19 +3678,17 @@
       </p:sp>
       <p:sp>
         <p:nvSpPr>
-          <p:cNvPr id="11" name="Rounded Rectangle 10"/>
+          <p:cNvPr id="11" name="Rectangle 10"/>
           <p:cNvSpPr/>
           <p:nvPr/>
         </p:nvSpPr>
         <p:spPr>
           <a:xfrm>
-            <a:off x="979401" y="2466210"/>
-            <a:ext cx="8909659" cy="4358606"/>
+            <a:off x="979401" y="2682794"/>
+            <a:ext cx="8909659" cy="4142022"/>
           </a:xfrm>
-          <a:prstGeom prst="roundRect">
-            <a:avLst>
-              <a:gd name="adj" fmla="val 7989"/>
-            </a:avLst>
+          <a:prstGeom prst="rect">
+            <a:avLst/>
           </a:prstGeom>
           <a:gradFill flip="none" rotWithShape="1">
             <a:gsLst>
@@ -3736,18 +3734,12 @@
           </a:fontRef>
         </p:style>
         <p:txBody>
-          <a:bodyPr rtlCol="1" anchor="t"/>
+          <a:bodyPr rtlCol="1" anchor="t">
+            <a:normAutofit/>
+          </a:bodyPr>
           <a:lstStyle/>
           <a:p>
             <a:pPr marL="0" lvl="2" algn="l" rtl="0"/>
-            <a:r>
-              <a:rPr lang="en-US" sz="3200" dirty="0" smtClean="0">
-                <a:solidFill>
-                  <a:schemeClr val="tx1"/>
-                </a:solidFill>
-              </a:rPr>
-              <a:t>$Comments</a:t>
-            </a:r>
             <a:endParaRPr lang="en-US" sz="3200" dirty="0">
               <a:solidFill>
                 <a:schemeClr val="tx1"/>
@@ -3766,8 +3758,8 @@
         </p:nvSpPr>
         <p:spPr>
           <a:xfrm>
-            <a:off x="221547" y="1740322"/>
-            <a:ext cx="9411973" cy="914527"/>
+            <a:off x="37966" y="1683064"/>
+            <a:ext cx="9851094" cy="1029044"/>
           </a:xfrm>
           <a:prstGeom prst="rect">
             <a:avLst/>
@@ -3775,20 +3767,20 @@
         </p:spPr>
         <p:txBody>
           <a:bodyPr vert="horz" lIns="91440" tIns="45720" rIns="91440" bIns="45720" rtlCol="1" anchor="ctr">
-            <a:noAutofit/>
+            <a:normAutofit/>
           </a:bodyPr>
           <a:lstStyle/>
           <a:p>
             <a:pPr lvl="0" algn="ctr" rtl="0"/>
             <a:r>
-              <a:rPr lang="en-US" sz="4000" b="1" dirty="0" smtClean="0"/>
+              <a:rPr lang="en-US" sz="3600" dirty="0" smtClean="0"/>
               <a:t>$</a:t>
             </a:r>
             <a:r>
-              <a:rPr lang="en-US" sz="4000" b="1" dirty="0" err="1" smtClean="0"/>
+              <a:rPr lang="en-US" sz="3600" dirty="0" err="1" smtClean="0"/>
               <a:t>TaskTitle</a:t>
             </a:r>
-            <a:endParaRPr lang="en-US" sz="4000" b="1" dirty="0" smtClean="0"/>
+            <a:endParaRPr lang="en-US" sz="3600" dirty="0" smtClean="0"/>
           </a:p>
         </p:txBody>
       </p:sp>
@@ -3801,14 +3793,14 @@
           <p:nvPr>
             <p:extLst>
               <p:ext uri="{D42A27DB-BD31-4B8C-83A1-F6EECF244321}">
-                <p14:modId xmlns:p14="http://schemas.microsoft.com/office/powerpoint/2010/main" val="84536073"/>
+                <p14:modId xmlns:p14="http://schemas.microsoft.com/office/powerpoint/2010/main" val="4232896895"/>
               </p:ext>
             </p:extLst>
           </p:nvPr>
         </p:nvGraphicFramePr>
         <p:xfrm>
-          <a:off x="13323" y="2487563"/>
-          <a:ext cx="952755" cy="4370438"/>
+          <a:off x="13323" y="2682793"/>
+          <a:ext cx="952755" cy="4192629"/>
         </p:xfrm>
         <a:graphic>
           <a:graphicData uri="http://schemas.openxmlformats.org/drawingml/2006/table">
@@ -3819,7 +3811,7 @@
               <a:tblGrid>
                 <a:gridCol w="952755"/>
               </a:tblGrid>
-              <a:tr h="460343">
+              <a:tr h="439779">
                 <a:tc>
                   <a:txBody>
                     <a:bodyPr/>
@@ -3836,7 +3828,7 @@
                   <a:tcPr/>
                 </a:tc>
               </a:tr>
-              <a:tr h="435389">
+              <a:tr h="415940">
                 <a:tc>
                   <a:txBody>
                     <a:bodyPr/>
@@ -3849,7 +3841,7 @@
                   <a:tcPr/>
                 </a:tc>
               </a:tr>
-              <a:tr h="435389">
+              <a:tr h="415940">
                 <a:tc>
                   <a:txBody>
                     <a:bodyPr/>
@@ -3862,7 +3854,7 @@
                   <a:tcPr/>
                 </a:tc>
               </a:tr>
-              <a:tr h="435389">
+              <a:tr h="415940">
                 <a:tc>
                   <a:txBody>
                     <a:bodyPr/>
@@ -3875,7 +3867,7 @@
                   <a:tcPr/>
                 </a:tc>
               </a:tr>
-              <a:tr h="435389">
+              <a:tr h="415940">
                 <a:tc>
                   <a:txBody>
                     <a:bodyPr/>
@@ -3888,7 +3880,7 @@
                   <a:tcPr/>
                 </a:tc>
               </a:tr>
-              <a:tr h="435389">
+              <a:tr h="415940">
                 <a:tc>
                   <a:txBody>
                     <a:bodyPr/>
@@ -3901,7 +3893,7 @@
                   <a:tcPr/>
                 </a:tc>
               </a:tr>
-              <a:tr h="435389">
+              <a:tr h="415940">
                 <a:tc>
                   <a:txBody>
                     <a:bodyPr/>
@@ -3914,7 +3906,7 @@
                   <a:tcPr/>
                 </a:tc>
               </a:tr>
-              <a:tr h="432587">
+              <a:tr h="413263">
                 <a:tc>
                   <a:txBody>
                     <a:bodyPr/>
@@ -3927,7 +3919,7 @@
                   <a:tcPr/>
                 </a:tc>
               </a:tr>
-              <a:tr h="432587">
+              <a:tr h="413263">
                 <a:tc>
                   <a:txBody>
                     <a:bodyPr/>
@@ -3940,7 +3932,7 @@
                   <a:tcPr/>
                 </a:tc>
               </a:tr>
-              <a:tr h="432587">
+              <a:tr h="413263">
                 <a:tc>
                   <a:txBody>
                     <a:bodyPr/>
@@ -4144,7 +4136,7 @@
                       <a:pPr algn="l" rtl="0"/>
                       <a:r>
                         <a:rPr lang="en-US" b="1" i="1" dirty="0" smtClean="0"/>
-                        <a:t>Estimated: $Left</a:t>
+                        <a:t>Estimated:</a:t>
                       </a:r>
                       <a:endParaRPr lang="en-US" b="1" i="1" dirty="0"/>
                     </a:p>
@@ -4601,6 +4593,74 @@
           </a:fontRef>
         </p:style>
       </p:cxnSp>
+      <p:sp>
+        <p:nvSpPr>
+          <p:cNvPr id="12" name="TextBox 11"/>
+          <p:cNvSpPr txBox="1"/>
+          <p:nvPr/>
+        </p:nvSpPr>
+        <p:spPr>
+          <a:xfrm>
+            <a:off x="8047631" y="6097269"/>
+            <a:ext cx="710491" cy="369332"/>
+          </a:xfrm>
+          <a:prstGeom prst="rect">
+            <a:avLst/>
+          </a:prstGeom>
+          <a:noFill/>
+        </p:spPr>
+        <p:txBody>
+          <a:bodyPr wrap="square" rtlCol="0">
+            <a:spAutoFit/>
+          </a:bodyPr>
+          <a:lstStyle/>
+          <a:p>
+            <a:pPr algn="ctr"/>
+            <a:r>
+              <a:rPr lang="en-US" b="1" i="1" dirty="0"/>
+              <a:t>$</a:t>
+            </a:r>
+            <a:r>
+              <a:rPr lang="en-US" b="1" i="1" dirty="0" smtClean="0"/>
+              <a:t>Left</a:t>
+            </a:r>
+            <a:endParaRPr lang="en-US" dirty="0"/>
+          </a:p>
+        </p:txBody>
+      </p:sp>
+      <p:sp>
+        <p:nvSpPr>
+          <p:cNvPr id="18" name="TextBox 17"/>
+          <p:cNvSpPr txBox="1"/>
+          <p:nvPr/>
+        </p:nvSpPr>
+        <p:spPr>
+          <a:xfrm>
+            <a:off x="1064568" y="2682794"/>
+            <a:ext cx="8724259" cy="3410502"/>
+          </a:xfrm>
+          <a:prstGeom prst="rect">
+            <a:avLst/>
+          </a:prstGeom>
+          <a:noFill/>
+        </p:spPr>
+        <p:txBody>
+          <a:bodyPr wrap="square" rtlCol="0">
+            <a:normAutofit/>
+          </a:bodyPr>
+          <a:lstStyle/>
+          <a:p>
+            <a:pPr marL="457200" lvl="2" indent="-457200" algn="l" rtl="0">
+              <a:buFont typeface="Wingdings" panose="05000000000000000000" pitchFamily="2" charset="2"/>
+              <a:buChar char="ü"/>
+            </a:pPr>
+            <a:r>
+              <a:rPr lang="en-US" sz="3200" dirty="0"/>
+              <a:t>$Comments</a:t>
+            </a:r>
+          </a:p>
+        </p:txBody>
+      </p:sp>
     </p:spTree>
     <p:extLst>
       <p:ext uri="{BB962C8B-B14F-4D97-AF65-F5344CB8AC3E}">

</xml_diff>

<commit_message>
- Added: Support for story priority by default (may be overridden by task priority) - Modified: Minor changes to template
</commit_message>
<xml_diff>
--- a/Tasks - Template - No Left.pptx
+++ b/Tasks - Template - No Left.pptx
@@ -781,7 +781,7 @@
             <a:fld id="{07804B90-9912-42C8-BA0E-9FC0A6BC0793}" type="datetime8">
               <a:rPr lang="he-IL" smtClean="0"/>
               <a:pPr/>
-              <a:t>01 דצמבר 15</a:t>
+              <a:t>07 ינואר 16</a:t>
             </a:fld>
             <a:endParaRPr lang="he-IL"/>
           </a:p>
@@ -948,7 +948,7 @@
             <a:fld id="{4FC8F92C-E7ED-4D50-BF01-90E6F05ADB47}" type="datetime8">
               <a:rPr lang="he-IL" smtClean="0"/>
               <a:pPr/>
-              <a:t>01 דצמבר 15</a:t>
+              <a:t>07 ינואר 16</a:t>
             </a:fld>
             <a:endParaRPr lang="he-IL"/>
           </a:p>
@@ -1125,7 +1125,7 @@
             <a:fld id="{BB1E4F72-57C3-4F4E-B209-0100575C922A}" type="datetime8">
               <a:rPr lang="he-IL" smtClean="0"/>
               <a:pPr/>
-              <a:t>01 דצמבר 15</a:t>
+              <a:t>07 ינואר 16</a:t>
             </a:fld>
             <a:endParaRPr lang="he-IL"/>
           </a:p>
@@ -1292,7 +1292,7 @@
             <a:fld id="{03F8D550-4BE1-4813-9BF3-2E5655BFF65B}" type="datetime8">
               <a:rPr lang="he-IL" smtClean="0"/>
               <a:pPr/>
-              <a:t>01 דצמבר 15</a:t>
+              <a:t>07 ינואר 16</a:t>
             </a:fld>
             <a:endParaRPr lang="he-IL"/>
           </a:p>
@@ -1535,7 +1535,7 @@
             <a:fld id="{69E1F784-D13F-4D7B-9F23-FB4B9CAAD233}" type="datetime8">
               <a:rPr lang="he-IL" smtClean="0"/>
               <a:pPr/>
-              <a:t>01 דצמבר 15</a:t>
+              <a:t>07 ינואר 16</a:t>
             </a:fld>
             <a:endParaRPr lang="he-IL"/>
           </a:p>
@@ -1820,7 +1820,7 @@
             <a:fld id="{217D017C-30CC-4CD6-8275-DF8EF54835B0}" type="datetime8">
               <a:rPr lang="he-IL" smtClean="0"/>
               <a:pPr/>
-              <a:t>01 דצמבר 15</a:t>
+              <a:t>07 ינואר 16</a:t>
             </a:fld>
             <a:endParaRPr lang="he-IL"/>
           </a:p>
@@ -2239,7 +2239,7 @@
             <a:fld id="{1866F88B-B92E-4516-9A2E-D93B7749C0E1}" type="datetime8">
               <a:rPr lang="he-IL" smtClean="0"/>
               <a:pPr/>
-              <a:t>01 דצמבר 15</a:t>
+              <a:t>07 ינואר 16</a:t>
             </a:fld>
             <a:endParaRPr lang="he-IL"/>
           </a:p>
@@ -2354,7 +2354,7 @@
             <a:fld id="{A680602D-4A41-4DFC-95D4-336A27DF9101}" type="datetime8">
               <a:rPr lang="he-IL" smtClean="0"/>
               <a:pPr/>
-              <a:t>01 דצמבר 15</a:t>
+              <a:t>07 ינואר 16</a:t>
             </a:fld>
             <a:endParaRPr lang="he-IL"/>
           </a:p>
@@ -2446,7 +2446,7 @@
             <a:fld id="{A6FECEB8-91EA-40F5-952B-F186C677B3AC}" type="datetime8">
               <a:rPr lang="he-IL" smtClean="0"/>
               <a:pPr/>
-              <a:t>01 דצמבר 15</a:t>
+              <a:t>07 ינואר 16</a:t>
             </a:fld>
             <a:endParaRPr lang="he-IL"/>
           </a:p>
@@ -2720,7 +2720,7 @@
             <a:fld id="{A23D05BF-E7F7-44C1-B9BA-193416E6943B}" type="datetime8">
               <a:rPr lang="he-IL" smtClean="0"/>
               <a:pPr/>
-              <a:t>01 דצמבר 15</a:t>
+              <a:t>07 ינואר 16</a:t>
             </a:fld>
             <a:endParaRPr lang="he-IL"/>
           </a:p>
@@ -2970,7 +2970,7 @@
             <a:fld id="{196AB0F6-2876-4040-AF90-0E2B7F359233}" type="datetime8">
               <a:rPr lang="he-IL" smtClean="0"/>
               <a:pPr/>
-              <a:t>01 דצמבר 15</a:t>
+              <a:t>07 ינואר 16</a:t>
             </a:fld>
             <a:endParaRPr lang="he-IL"/>
           </a:p>
@@ -3180,7 +3180,7 @@
             <a:fld id="{556212AB-3C14-44EA-ADB9-C0E2E4C9AFDE}" type="datetime8">
               <a:rPr lang="he-IL" smtClean="0"/>
               <a:pPr/>
-              <a:t>01 דצמבר 15</a:t>
+              <a:t>07 ינואר 16</a:t>
             </a:fld>
             <a:endParaRPr lang="he-IL"/>
           </a:p>
@@ -3582,25 +3582,25 @@
         </p:spPr>
         <p:txBody>
           <a:bodyPr vert="horz" lIns="828000" tIns="45720" rIns="91440" bIns="45720" rtlCol="1" anchor="ctr">
-            <a:noAutofit/>
+            <a:normAutofit/>
           </a:bodyPr>
           <a:lstStyle/>
           <a:p>
-            <a:pPr lvl="0" algn="ctr" rtl="0">
+            <a:pPr algn="ctr" rtl="0">
               <a:spcBef>
                 <a:spcPct val="0"/>
               </a:spcBef>
               <a:defRPr/>
             </a:pPr>
             <a:r>
-              <a:rPr lang="en-US" sz="4000" b="1" dirty="0" smtClean="0"/>
+              <a:rPr lang="en-US" sz="4000" b="1" dirty="0"/>
               <a:t>$</a:t>
             </a:r>
             <a:r>
               <a:rPr lang="en-US" sz="4000" b="1" dirty="0" err="1" smtClean="0"/>
               <a:t>UserStory</a:t>
             </a:r>
-            <a:endParaRPr lang="en-US" sz="4000" b="1" dirty="0" smtClean="0"/>
+            <a:endParaRPr lang="en-US" sz="4000" b="1" dirty="0"/>
           </a:p>
         </p:txBody>
       </p:sp>
@@ -3623,12 +3623,12 @@
               <a:gs pos="0">
                 <a:schemeClr val="bg1"/>
               </a:gs>
-              <a:gs pos="58000">
+              <a:gs pos="77000">
                 <a:schemeClr val="bg1">
                   <a:lumMod val="95000"/>
                 </a:schemeClr>
               </a:gs>
-              <a:gs pos="83000">
+              <a:gs pos="100000">
                 <a:schemeClr val="bg1">
                   <a:lumMod val="85000"/>
                 </a:schemeClr>
@@ -3692,7 +3692,10 @@
           </a:prstGeom>
           <a:gradFill flip="none" rotWithShape="1">
             <a:gsLst>
-              <a:gs pos="34000">
+              <a:gs pos="0">
+                <a:schemeClr val="bg1"/>
+              </a:gs>
+              <a:gs pos="78000">
                 <a:schemeClr val="accent1">
                   <a:lumMod val="5000"/>
                   <a:lumOff val="95000"/>
@@ -3809,7 +3812,13 @@
                 <a:tableStyleId>{69012ECD-51FC-41F1-AA8D-1B2483CD663E}</a:tableStyleId>
               </a:tblPr>
               <a:tblGrid>
-                <a:gridCol w="952755"/>
+                <a:gridCol w="952755">
+                  <a:extLst>
+                    <a:ext uri="{9D8B030D-6E8A-4147-A177-3AD203B41FA5}">
+                      <a16:colId xmlns:a16="http://schemas.microsoft.com/office/drawing/2014/main" val="20000"/>
+                    </a:ext>
+                  </a:extLst>
+                </a:gridCol>
               </a:tblGrid>
               <a:tr h="439779">
                 <a:tc>
@@ -3827,6 +3836,11 @@
                   </a:txBody>
                   <a:tcPr/>
                 </a:tc>
+                <a:extLst>
+                  <a:ext uri="{0D108BD9-81ED-4DB2-BD59-A6C34878D82A}">
+                    <a16:rowId xmlns:a16="http://schemas.microsoft.com/office/drawing/2014/main" val="10000"/>
+                  </a:ext>
+                </a:extLst>
               </a:tr>
               <a:tr h="415940">
                 <a:tc>
@@ -3840,6 +3854,11 @@
                   </a:txBody>
                   <a:tcPr/>
                 </a:tc>
+                <a:extLst>
+                  <a:ext uri="{0D108BD9-81ED-4DB2-BD59-A6C34878D82A}">
+                    <a16:rowId xmlns:a16="http://schemas.microsoft.com/office/drawing/2014/main" val="10001"/>
+                  </a:ext>
+                </a:extLst>
               </a:tr>
               <a:tr h="415940">
                 <a:tc>
@@ -3853,6 +3872,11 @@
                   </a:txBody>
                   <a:tcPr/>
                 </a:tc>
+                <a:extLst>
+                  <a:ext uri="{0D108BD9-81ED-4DB2-BD59-A6C34878D82A}">
+                    <a16:rowId xmlns:a16="http://schemas.microsoft.com/office/drawing/2014/main" val="10002"/>
+                  </a:ext>
+                </a:extLst>
               </a:tr>
               <a:tr h="415940">
                 <a:tc>
@@ -3866,6 +3890,11 @@
                   </a:txBody>
                   <a:tcPr/>
                 </a:tc>
+                <a:extLst>
+                  <a:ext uri="{0D108BD9-81ED-4DB2-BD59-A6C34878D82A}">
+                    <a16:rowId xmlns:a16="http://schemas.microsoft.com/office/drawing/2014/main" val="10003"/>
+                  </a:ext>
+                </a:extLst>
               </a:tr>
               <a:tr h="415940">
                 <a:tc>
@@ -3879,6 +3908,11 @@
                   </a:txBody>
                   <a:tcPr/>
                 </a:tc>
+                <a:extLst>
+                  <a:ext uri="{0D108BD9-81ED-4DB2-BD59-A6C34878D82A}">
+                    <a16:rowId xmlns:a16="http://schemas.microsoft.com/office/drawing/2014/main" val="10004"/>
+                  </a:ext>
+                </a:extLst>
               </a:tr>
               <a:tr h="415940">
                 <a:tc>
@@ -3892,6 +3926,11 @@
                   </a:txBody>
                   <a:tcPr/>
                 </a:tc>
+                <a:extLst>
+                  <a:ext uri="{0D108BD9-81ED-4DB2-BD59-A6C34878D82A}">
+                    <a16:rowId xmlns:a16="http://schemas.microsoft.com/office/drawing/2014/main" val="10005"/>
+                  </a:ext>
+                </a:extLst>
               </a:tr>
               <a:tr h="415940">
                 <a:tc>
@@ -3905,6 +3944,11 @@
                   </a:txBody>
                   <a:tcPr/>
                 </a:tc>
+                <a:extLst>
+                  <a:ext uri="{0D108BD9-81ED-4DB2-BD59-A6C34878D82A}">
+                    <a16:rowId xmlns:a16="http://schemas.microsoft.com/office/drawing/2014/main" val="10006"/>
+                  </a:ext>
+                </a:extLst>
               </a:tr>
               <a:tr h="413263">
                 <a:tc>
@@ -3918,6 +3962,11 @@
                   </a:txBody>
                   <a:tcPr/>
                 </a:tc>
+                <a:extLst>
+                  <a:ext uri="{0D108BD9-81ED-4DB2-BD59-A6C34878D82A}">
+                    <a16:rowId xmlns:a16="http://schemas.microsoft.com/office/drawing/2014/main" val="10007"/>
+                  </a:ext>
+                </a:extLst>
               </a:tr>
               <a:tr h="413263">
                 <a:tc>
@@ -3931,6 +3980,11 @@
                   </a:txBody>
                   <a:tcPr/>
                 </a:tc>
+                <a:extLst>
+                  <a:ext uri="{0D108BD9-81ED-4DB2-BD59-A6C34878D82A}">
+                    <a16:rowId xmlns:a16="http://schemas.microsoft.com/office/drawing/2014/main" val="10008"/>
+                  </a:ext>
+                </a:extLst>
               </a:tr>
               <a:tr h="413263">
                 <a:tc>
@@ -3944,6 +3998,11 @@
                   </a:txBody>
                   <a:tcPr/>
                 </a:tc>
+                <a:extLst>
+                  <a:ext uri="{0D108BD9-81ED-4DB2-BD59-A6C34878D82A}">
+                    <a16:rowId xmlns:a16="http://schemas.microsoft.com/office/drawing/2014/main" val="10009"/>
+                  </a:ext>
+                </a:extLst>
               </a:tr>
             </a:tbl>
           </a:graphicData>
@@ -3957,8 +4016,8 @@
         </p:nvSpPr>
         <p:spPr>
           <a:xfrm>
-            <a:off x="66240" y="614785"/>
-            <a:ext cx="1224136" cy="1296144"/>
+            <a:off x="-58788" y="750585"/>
+            <a:ext cx="998328" cy="1057053"/>
           </a:xfrm>
           <a:prstGeom prst="irregularSeal1">
             <a:avLst/>
@@ -3986,10 +4045,10 @@
           <a:p>
             <a:pPr algn="ctr"/>
             <a:r>
-              <a:rPr lang="en-US" sz="3600" dirty="0" smtClean="0"/>
+              <a:rPr lang="en-US" sz="2800" dirty="0" smtClean="0"/>
               <a:t>$P</a:t>
             </a:r>
-            <a:endParaRPr lang="he-IL" sz="3600" dirty="0"/>
+            <a:endParaRPr lang="he-IL" sz="2800" dirty="0"/>
           </a:p>
         </p:txBody>
       </p:sp>
@@ -4018,10 +4077,34 @@
                 <a:tableStyleId>{5940675A-B579-460E-94D1-54222C63F5DA}</a:tableStyleId>
               </a:tblPr>
               <a:tblGrid>
-                <a:gridCol w="1307109"/>
-                <a:gridCol w="1501203"/>
-                <a:gridCol w="3117251"/>
-                <a:gridCol w="2826970"/>
+                <a:gridCol w="1307109">
+                  <a:extLst>
+                    <a:ext uri="{9D8B030D-6E8A-4147-A177-3AD203B41FA5}">
+                      <a16:colId xmlns:a16="http://schemas.microsoft.com/office/drawing/2014/main" val="20000"/>
+                    </a:ext>
+                  </a:extLst>
+                </a:gridCol>
+                <a:gridCol w="1501203">
+                  <a:extLst>
+                    <a:ext uri="{9D8B030D-6E8A-4147-A177-3AD203B41FA5}">
+                      <a16:colId xmlns:a16="http://schemas.microsoft.com/office/drawing/2014/main" val="20001"/>
+                    </a:ext>
+                  </a:extLst>
+                </a:gridCol>
+                <a:gridCol w="3117251">
+                  <a:extLst>
+                    <a:ext uri="{9D8B030D-6E8A-4147-A177-3AD203B41FA5}">
+                      <a16:colId xmlns:a16="http://schemas.microsoft.com/office/drawing/2014/main" val="20002"/>
+                    </a:ext>
+                  </a:extLst>
+                </a:gridCol>
+                <a:gridCol w="2826970">
+                  <a:extLst>
+                    <a:ext uri="{9D8B030D-6E8A-4147-A177-3AD203B41FA5}">
+                      <a16:colId xmlns:a16="http://schemas.microsoft.com/office/drawing/2014/main" val="20003"/>
+                    </a:ext>
+                  </a:extLst>
+                </a:gridCol>
               </a:tblGrid>
               <a:tr h="348918">
                 <a:tc>
@@ -4176,6 +4259,11 @@
                     </a:lnB>
                   </a:tcPr>
                 </a:tc>
+                <a:extLst>
+                  <a:ext uri="{0D108BD9-81ED-4DB2-BD59-A6C34878D82A}">
+                    <a16:rowId xmlns:a16="http://schemas.microsoft.com/office/drawing/2014/main" val="10000"/>
+                  </a:ext>
+                </a:extLst>
               </a:tr>
               <a:tr h="348918">
                 <a:tc>
@@ -4326,6 +4414,11 @@
                     </a:lnB>
                   </a:tcPr>
                 </a:tc>
+                <a:extLst>
+                  <a:ext uri="{0D108BD9-81ED-4DB2-BD59-A6C34878D82A}">
+                    <a16:rowId xmlns:a16="http://schemas.microsoft.com/office/drawing/2014/main" val="10001"/>
+                  </a:ext>
+                </a:extLst>
               </a:tr>
             </a:tbl>
           </a:graphicData>
@@ -4671,13 +4764,6 @@
   <p:clrMapOvr>
     <a:masterClrMapping/>
   </p:clrMapOvr>
-  <p:timing>
-    <p:tnLst>
-      <p:par>
-        <p:cTn id="1" dur="indefinite" restart="never" nodeType="tmRoot"/>
-      </p:par>
-    </p:tnLst>
-  </p:timing>
 </p:sld>
 </file>
 

</xml_diff>